<commit_message>
edit week 4 slides
</commit_message>
<xml_diff>
--- a/slides/w4p1-penalized-regression/w4p1_draft.pptx
+++ b/slides/w4p1-penalized-regression/w4p1_draft.pptx
@@ -345,7 +345,7 @@
                 </a:solidFill>
               </a:rPr>
               <a:pPr/>
-              <a:t>3/5/2020</a:t>
+              <a:t>3/11/2020</a:t>
             </a:fld>
             <a:endParaRPr lang="en-US">
               <a:solidFill>
@@ -545,7 +545,7 @@
                 </a:solidFill>
               </a:rPr>
               <a:pPr/>
-              <a:t>3/5/2020</a:t>
+              <a:t>3/11/2020</a:t>
             </a:fld>
             <a:endParaRPr lang="en-US">
               <a:solidFill>
@@ -755,7 +755,7 @@
                 </a:solidFill>
               </a:rPr>
               <a:pPr/>
-              <a:t>3/5/2020</a:t>
+              <a:t>3/11/2020</a:t>
             </a:fld>
             <a:endParaRPr lang="en-US">
               <a:solidFill>
@@ -955,7 +955,7 @@
                 </a:solidFill>
               </a:rPr>
               <a:pPr/>
-              <a:t>3/5/2020</a:t>
+              <a:t>3/11/2020</a:t>
             </a:fld>
             <a:endParaRPr lang="en-US">
               <a:solidFill>
@@ -1232,7 +1232,7 @@
                 </a:solidFill>
               </a:rPr>
               <a:pPr/>
-              <a:t>3/5/2020</a:t>
+              <a:t>3/11/2020</a:t>
             </a:fld>
             <a:endParaRPr lang="en-US">
               <a:solidFill>
@@ -1493,7 +1493,7 @@
                 </a:solidFill>
               </a:rPr>
               <a:pPr/>
-              <a:t>3/5/2020</a:t>
+              <a:t>3/11/2020</a:t>
             </a:fld>
             <a:endParaRPr lang="en-US">
               <a:solidFill>
@@ -1889,7 +1889,7 @@
                 </a:solidFill>
               </a:rPr>
               <a:pPr/>
-              <a:t>3/5/2020</a:t>
+              <a:t>3/11/2020</a:t>
             </a:fld>
             <a:endParaRPr lang="en-US">
               <a:solidFill>
@@ -2038,7 +2038,7 @@
                 </a:solidFill>
               </a:rPr>
               <a:pPr/>
-              <a:t>3/5/2020</a:t>
+              <a:t>3/11/2020</a:t>
             </a:fld>
             <a:endParaRPr lang="en-US">
               <a:solidFill>
@@ -2165,7 +2165,7 @@
                 </a:solidFill>
               </a:rPr>
               <a:pPr/>
-              <a:t>3/5/2020</a:t>
+              <a:t>3/11/2020</a:t>
             </a:fld>
             <a:endParaRPr lang="en-US">
               <a:solidFill>
@@ -2472,7 +2472,7 @@
                 </a:solidFill>
               </a:rPr>
               <a:pPr/>
-              <a:t>3/5/2020</a:t>
+              <a:t>3/11/2020</a:t>
             </a:fld>
             <a:endParaRPr lang="en-US">
               <a:solidFill>
@@ -2756,7 +2756,7 @@
                 </a:solidFill>
               </a:rPr>
               <a:pPr/>
-              <a:t>3/5/2020</a:t>
+              <a:t>3/11/2020</a:t>
             </a:fld>
             <a:endParaRPr lang="en-US">
               <a:solidFill>
@@ -2999,7 +2999,7 @@
                 </a:solidFill>
               </a:rPr>
               <a:pPr/>
-              <a:t>3/5/2020</a:t>
+              <a:t>3/11/2020</a:t>
             </a:fld>
             <a:endParaRPr lang="en-US">
               <a:solidFill>
@@ -16780,7 +16780,7 @@
                 <a:latin typeface="Courier New" panose="02070309020205020404" pitchFamily="49" charset="0"/>
                 <a:cs typeface="Courier New" panose="02070309020205020404" pitchFamily="49" charset="0"/>
               </a:rPr>
-              <a:t>tune:: </a:t>
+              <a:t>tune::</a:t>
             </a:r>
             <a:r>
               <a:rPr lang="en-US" sz="2400" dirty="0" err="1">

</xml_diff>

<commit_message>
draft of knn & updates to penalized models stuff
</commit_message>
<xml_diff>
--- a/slides/w4p1-penalized-regression/w4p1_draft.pptx
+++ b/slides/w4p1-penalized-regression/w4p1_draft.pptx
@@ -345,7 +345,7 @@
                 </a:solidFill>
               </a:rPr>
               <a:pPr/>
-              <a:t>3/11/2020</a:t>
+              <a:t>3/18/2020</a:t>
             </a:fld>
             <a:endParaRPr lang="en-US">
               <a:solidFill>
@@ -545,7 +545,7 @@
                 </a:solidFill>
               </a:rPr>
               <a:pPr/>
-              <a:t>3/11/2020</a:t>
+              <a:t>3/18/2020</a:t>
             </a:fld>
             <a:endParaRPr lang="en-US">
               <a:solidFill>
@@ -755,7 +755,7 @@
                 </a:solidFill>
               </a:rPr>
               <a:pPr/>
-              <a:t>3/11/2020</a:t>
+              <a:t>3/18/2020</a:t>
             </a:fld>
             <a:endParaRPr lang="en-US">
               <a:solidFill>
@@ -955,7 +955,7 @@
                 </a:solidFill>
               </a:rPr>
               <a:pPr/>
-              <a:t>3/11/2020</a:t>
+              <a:t>3/18/2020</a:t>
             </a:fld>
             <a:endParaRPr lang="en-US">
               <a:solidFill>
@@ -1232,7 +1232,7 @@
                 </a:solidFill>
               </a:rPr>
               <a:pPr/>
-              <a:t>3/11/2020</a:t>
+              <a:t>3/18/2020</a:t>
             </a:fld>
             <a:endParaRPr lang="en-US">
               <a:solidFill>
@@ -1493,7 +1493,7 @@
                 </a:solidFill>
               </a:rPr>
               <a:pPr/>
-              <a:t>3/11/2020</a:t>
+              <a:t>3/18/2020</a:t>
             </a:fld>
             <a:endParaRPr lang="en-US">
               <a:solidFill>
@@ -1889,7 +1889,7 @@
                 </a:solidFill>
               </a:rPr>
               <a:pPr/>
-              <a:t>3/11/2020</a:t>
+              <a:t>3/18/2020</a:t>
             </a:fld>
             <a:endParaRPr lang="en-US">
               <a:solidFill>
@@ -2038,7 +2038,7 @@
                 </a:solidFill>
               </a:rPr>
               <a:pPr/>
-              <a:t>3/11/2020</a:t>
+              <a:t>3/18/2020</a:t>
             </a:fld>
             <a:endParaRPr lang="en-US">
               <a:solidFill>
@@ -2165,7 +2165,7 @@
                 </a:solidFill>
               </a:rPr>
               <a:pPr/>
-              <a:t>3/11/2020</a:t>
+              <a:t>3/18/2020</a:t>
             </a:fld>
             <a:endParaRPr lang="en-US">
               <a:solidFill>
@@ -2472,7 +2472,7 @@
                 </a:solidFill>
               </a:rPr>
               <a:pPr/>
-              <a:t>3/11/2020</a:t>
+              <a:t>3/18/2020</a:t>
             </a:fld>
             <a:endParaRPr lang="en-US">
               <a:solidFill>
@@ -2756,7 +2756,7 @@
                 </a:solidFill>
               </a:rPr>
               <a:pPr/>
-              <a:t>3/11/2020</a:t>
+              <a:t>3/18/2020</a:t>
             </a:fld>
             <a:endParaRPr lang="en-US">
               <a:solidFill>
@@ -2999,7 +2999,7 @@
                 </a:solidFill>
               </a:rPr>
               <a:pPr/>
-              <a:t>3/11/2020</a:t>
+              <a:t>3/18/2020</a:t>
             </a:fld>
             <a:endParaRPr lang="en-US">
               <a:solidFill>
@@ -42062,6 +42062,15 @@
               <a:t>Max’s Feat Engineering book, 7.3.2</a:t>
             </a:r>
           </a:p>
+          <a:p>
+            <a:endParaRPr lang="en-US" dirty="0"/>
+          </a:p>
+          <a:p>
+            <a:r>
+              <a:rPr lang="en-US" dirty="0"/>
+              <a:t>Applied ML slides. Part 5, 23-26</a:t>
+            </a:r>
+          </a:p>
         </p:txBody>
       </p:sp>
       <p:sp>

</xml_diff>